<commit_message>
Add presentation week 9
</commit_message>
<xml_diff>
--- a/EEG_project_week9.pptx
+++ b/EEG_project_week9.pptx
@@ -12,19 +12,22 @@
     <p:sldId id="261" r:id="rId6"/>
     <p:sldId id="262" r:id="rId7"/>
     <p:sldId id="263" r:id="rId8"/>
-    <p:sldId id="264" r:id="rId9"/>
-    <p:sldId id="265" r:id="rId10"/>
-    <p:sldId id="266" r:id="rId11"/>
-    <p:sldId id="267" r:id="rId12"/>
-    <p:sldId id="268" r:id="rId13"/>
-    <p:sldId id="270" r:id="rId14"/>
-    <p:sldId id="271" r:id="rId15"/>
-    <p:sldId id="269" r:id="rId16"/>
-    <p:sldId id="272" r:id="rId17"/>
-    <p:sldId id="273" r:id="rId18"/>
-    <p:sldId id="275" r:id="rId19"/>
-    <p:sldId id="274" r:id="rId20"/>
-    <p:sldId id="276" r:id="rId21"/>
+    <p:sldId id="277" r:id="rId9"/>
+    <p:sldId id="264" r:id="rId10"/>
+    <p:sldId id="265" r:id="rId11"/>
+    <p:sldId id="266" r:id="rId12"/>
+    <p:sldId id="267" r:id="rId13"/>
+    <p:sldId id="268" r:id="rId14"/>
+    <p:sldId id="270" r:id="rId15"/>
+    <p:sldId id="271" r:id="rId16"/>
+    <p:sldId id="269" r:id="rId17"/>
+    <p:sldId id="272" r:id="rId18"/>
+    <p:sldId id="273" r:id="rId19"/>
+    <p:sldId id="275" r:id="rId20"/>
+    <p:sldId id="274" r:id="rId21"/>
+    <p:sldId id="276" r:id="rId22"/>
+    <p:sldId id="278" r:id="rId23"/>
+    <p:sldId id="279" r:id="rId24"/>
   </p:sldIdLst>
   <p:sldSz cx="9144000" cy="6858000" type="screen4x3"/>
   <p:notesSz cx="6858000" cy="9144000"/>
@@ -784,7 +787,7 @@
           <a:p>
             <a:fld id="{815FDF4E-02FA-495D-9F7F-218675B6E325}" type="datetimeFigureOut">
               <a:rPr lang="he-IL" smtClean="0"/>
-              <a:t>ה'/טבת/תשע"ח</a:t>
+              <a:t>ז'/טבת/תשע"ח</a:t>
             </a:fld>
             <a:endParaRPr lang="he-IL"/>
           </a:p>
@@ -967,7 +970,7 @@
           <a:p>
             <a:fld id="{815FDF4E-02FA-495D-9F7F-218675B6E325}" type="datetimeFigureOut">
               <a:rPr lang="he-IL" smtClean="0"/>
-              <a:t>ה'/טבת/תשע"ח</a:t>
+              <a:t>ז'/טבת/תשע"ח</a:t>
             </a:fld>
             <a:endParaRPr lang="he-IL"/>
           </a:p>
@@ -1142,7 +1145,7 @@
           <a:p>
             <a:fld id="{815FDF4E-02FA-495D-9F7F-218675B6E325}" type="datetimeFigureOut">
               <a:rPr lang="he-IL" smtClean="0"/>
-              <a:t>ה'/טבת/תשע"ח</a:t>
+              <a:t>ז'/טבת/תשע"ח</a:t>
             </a:fld>
             <a:endParaRPr lang="he-IL"/>
           </a:p>
@@ -1307,7 +1310,7 @@
           <a:p>
             <a:fld id="{815FDF4E-02FA-495D-9F7F-218675B6E325}" type="datetimeFigureOut">
               <a:rPr lang="he-IL" smtClean="0"/>
-              <a:t>ה'/טבת/תשע"ח</a:t>
+              <a:t>ז'/טבת/תשע"ח</a:t>
             </a:fld>
             <a:endParaRPr lang="he-IL"/>
           </a:p>
@@ -1528,7 +1531,7 @@
           <a:p>
             <a:fld id="{815FDF4E-02FA-495D-9F7F-218675B6E325}" type="datetimeFigureOut">
               <a:rPr lang="he-IL" smtClean="0"/>
-              <a:t>ה'/טבת/תשע"ח</a:t>
+              <a:t>ז'/טבת/תשע"ח</a:t>
             </a:fld>
             <a:endParaRPr lang="he-IL"/>
           </a:p>
@@ -1787,7 +1790,7 @@
           <a:p>
             <a:fld id="{815FDF4E-02FA-495D-9F7F-218675B6E325}" type="datetimeFigureOut">
               <a:rPr lang="he-IL" smtClean="0"/>
-              <a:t>ה'/טבת/תשע"ח</a:t>
+              <a:t>ז'/טבת/תשע"ח</a:t>
             </a:fld>
             <a:endParaRPr lang="he-IL"/>
           </a:p>
@@ -2191,7 +2194,7 @@
           <a:p>
             <a:fld id="{815FDF4E-02FA-495D-9F7F-218675B6E325}" type="datetimeFigureOut">
               <a:rPr lang="he-IL" smtClean="0"/>
-              <a:t>ה'/טבת/תשע"ח</a:t>
+              <a:t>ז'/טבת/תשע"ח</a:t>
             </a:fld>
             <a:endParaRPr lang="he-IL"/>
           </a:p>
@@ -2322,7 +2325,7 @@
           <a:p>
             <a:fld id="{815FDF4E-02FA-495D-9F7F-218675B6E325}" type="datetimeFigureOut">
               <a:rPr lang="he-IL" smtClean="0"/>
-              <a:t>ה'/טבת/תשע"ח</a:t>
+              <a:t>ז'/טבת/תשע"ח</a:t>
             </a:fld>
             <a:endParaRPr lang="he-IL"/>
           </a:p>
@@ -2422,7 +2425,7 @@
           <a:p>
             <a:fld id="{815FDF4E-02FA-495D-9F7F-218675B6E325}" type="datetimeFigureOut">
               <a:rPr lang="he-IL" smtClean="0"/>
-              <a:t>ה'/טבת/תשע"ח</a:t>
+              <a:t>ז'/טבת/תשע"ח</a:t>
             </a:fld>
             <a:endParaRPr lang="he-IL"/>
           </a:p>
@@ -2667,7 +2670,7 @@
           <a:p>
             <a:fld id="{815FDF4E-02FA-495D-9F7F-218675B6E325}" type="datetimeFigureOut">
               <a:rPr lang="he-IL" smtClean="0"/>
-              <a:t>ה'/טבת/תשע"ח</a:t>
+              <a:t>ז'/טבת/תשע"ח</a:t>
             </a:fld>
             <a:endParaRPr lang="he-IL"/>
           </a:p>
@@ -2911,7 +2914,7 @@
           <a:p>
             <a:fld id="{815FDF4E-02FA-495D-9F7F-218675B6E325}" type="datetimeFigureOut">
               <a:rPr lang="he-IL" smtClean="0"/>
-              <a:t>ה'/טבת/תשע"ח</a:t>
+              <a:t>ז'/טבת/תשע"ח</a:t>
             </a:fld>
             <a:endParaRPr lang="he-IL"/>
           </a:p>
@@ -3735,7 +3738,7 @@
           <a:p>
             <a:fld id="{815FDF4E-02FA-495D-9F7F-218675B6E325}" type="datetimeFigureOut">
               <a:rPr lang="he-IL" smtClean="0"/>
-              <a:t>ה'/טבת/תשע"ח</a:t>
+              <a:t>ז'/טבת/תשע"ח</a:t>
             </a:fld>
             <a:endParaRPr lang="he-IL"/>
           </a:p>
@@ -4201,6 +4204,271 @@
       </p:grpSpPr>
       <p:pic>
         <p:nvPicPr>
+          <p:cNvPr id="2050" name="Picture 2"/>
+          <p:cNvPicPr>
+            <a:picLocks noChangeAspect="1" noChangeArrowheads="1"/>
+          </p:cNvPicPr>
+          <p:nvPr/>
+        </p:nvPicPr>
+        <p:blipFill>
+          <a:blip r:embed="rId2">
+            <a:extLst>
+              <a:ext uri="{28A0092B-C50C-407E-A947-70E740481C1C}">
+                <a14:useLocalDpi xmlns:a14="http://schemas.microsoft.com/office/drawing/2010/main" val="0"/>
+              </a:ext>
+            </a:extLst>
+          </a:blip>
+          <a:srcRect/>
+          <a:stretch>
+            <a:fillRect/>
+          </a:stretch>
+        </p:blipFill>
+        <p:spPr bwMode="auto">
+          <a:xfrm>
+            <a:off x="251520" y="1436295"/>
+            <a:ext cx="4200606" cy="3149203"/>
+          </a:xfrm>
+          <a:prstGeom prst="rect">
+            <a:avLst/>
+          </a:prstGeom>
+          <a:noFill/>
+          <a:ln>
+            <a:noFill/>
+          </a:ln>
+          <a:effectLst/>
+          <a:extLst>
+            <a:ext uri="{909E8E84-426E-40DD-AFC4-6F175D3DCCD1}">
+              <a14:hiddenFill xmlns:a14="http://schemas.microsoft.com/office/drawing/2010/main">
+                <a:solidFill>
+                  <a:schemeClr val="accent1"/>
+                </a:solidFill>
+              </a14:hiddenFill>
+            </a:ext>
+            <a:ext uri="{91240B29-F687-4F45-9708-019B960494DF}">
+              <a14:hiddenLine xmlns:a14="http://schemas.microsoft.com/office/drawing/2010/main" w="9525">
+                <a:solidFill>
+                  <a:schemeClr val="tx1"/>
+                </a:solidFill>
+                <a:miter lim="800000"/>
+                <a:headEnd/>
+                <a:tailEnd/>
+              </a14:hiddenLine>
+            </a:ext>
+            <a:ext uri="{AF507438-7753-43E0-B8FC-AC1667EBCBE1}">
+              <a14:hiddenEffects xmlns:a14="http://schemas.microsoft.com/office/drawing/2010/main">
+                <a:effectLst>
+                  <a:outerShdw dist="35921" dir="2700000" algn="ctr" rotWithShape="0">
+                    <a:schemeClr val="bg2"/>
+                  </a:outerShdw>
+                </a:effectLst>
+              </a14:hiddenEffects>
+            </a:ext>
+          </a:extLst>
+        </p:spPr>
+      </p:pic>
+      <p:sp>
+        <p:nvSpPr>
+          <p:cNvPr id="2" name="TextBox 1"/>
+          <p:cNvSpPr txBox="1"/>
+          <p:nvPr/>
+        </p:nvSpPr>
+        <p:spPr>
+          <a:xfrm>
+            <a:off x="251520" y="620688"/>
+            <a:ext cx="6768752" cy="646331"/>
+          </a:xfrm>
+          <a:prstGeom prst="rect">
+            <a:avLst/>
+          </a:prstGeom>
+          <a:noFill/>
+        </p:spPr>
+        <p:txBody>
+          <a:bodyPr wrap="square" rtlCol="1">
+            <a:spAutoFit/>
+          </a:bodyPr>
+          <a:lstStyle/>
+          <a:p>
+            <a:pPr algn="l"/>
+            <a:r>
+              <a:rPr lang="en-US" dirty="0" smtClean="0"/>
+              <a:t>Train data: C02,C03,C04</a:t>
+            </a:r>
+          </a:p>
+          <a:p>
+            <a:pPr algn="l"/>
+            <a:r>
+              <a:rPr lang="en-US" dirty="0" smtClean="0"/>
+              <a:t>Test data:   C01</a:t>
+            </a:r>
+            <a:endParaRPr lang="he-IL" dirty="0"/>
+          </a:p>
+        </p:txBody>
+      </p:sp>
+      <p:pic>
+        <p:nvPicPr>
+          <p:cNvPr id="4" name="Picture 2"/>
+          <p:cNvPicPr>
+            <a:picLocks noChangeAspect="1" noChangeArrowheads="1"/>
+          </p:cNvPicPr>
+          <p:nvPr/>
+        </p:nvPicPr>
+        <p:blipFill>
+          <a:blip r:embed="rId3">
+            <a:extLst>
+              <a:ext uri="{28A0092B-C50C-407E-A947-70E740481C1C}">
+                <a14:useLocalDpi xmlns:a14="http://schemas.microsoft.com/office/drawing/2010/main" val="0"/>
+              </a:ext>
+            </a:extLst>
+          </a:blip>
+          <a:srcRect/>
+          <a:stretch>
+            <a:fillRect/>
+          </a:stretch>
+        </p:blipFill>
+        <p:spPr bwMode="auto">
+          <a:xfrm>
+            <a:off x="4509575" y="1436295"/>
+            <a:ext cx="4265282" cy="3197691"/>
+          </a:xfrm>
+          <a:prstGeom prst="rect">
+            <a:avLst/>
+          </a:prstGeom>
+          <a:noFill/>
+          <a:ln>
+            <a:noFill/>
+          </a:ln>
+          <a:effectLst/>
+          <a:extLst>
+            <a:ext uri="{909E8E84-426E-40DD-AFC4-6F175D3DCCD1}">
+              <a14:hiddenFill xmlns:a14="http://schemas.microsoft.com/office/drawing/2010/main">
+                <a:solidFill>
+                  <a:schemeClr val="accent1"/>
+                </a:solidFill>
+              </a14:hiddenFill>
+            </a:ext>
+            <a:ext uri="{91240B29-F687-4F45-9708-019B960494DF}">
+              <a14:hiddenLine xmlns:a14="http://schemas.microsoft.com/office/drawing/2010/main" w="9525">
+                <a:solidFill>
+                  <a:schemeClr val="tx1"/>
+                </a:solidFill>
+                <a:miter lim="800000"/>
+                <a:headEnd/>
+                <a:tailEnd/>
+              </a14:hiddenLine>
+            </a:ext>
+            <a:ext uri="{AF507438-7753-43E0-B8FC-AC1667EBCBE1}">
+              <a14:hiddenEffects xmlns:a14="http://schemas.microsoft.com/office/drawing/2010/main">
+                <a:effectLst>
+                  <a:outerShdw dist="35921" dir="2700000" algn="ctr" rotWithShape="0">
+                    <a:schemeClr val="bg2"/>
+                  </a:outerShdw>
+                </a:effectLst>
+              </a14:hiddenEffects>
+            </a:ext>
+          </a:extLst>
+        </p:spPr>
+      </p:pic>
+      <p:sp>
+        <p:nvSpPr>
+          <p:cNvPr id="3" name="TextBox 2"/>
+          <p:cNvSpPr txBox="1"/>
+          <p:nvPr/>
+        </p:nvSpPr>
+        <p:spPr>
+          <a:xfrm>
+            <a:off x="5580112" y="5013176"/>
+            <a:ext cx="2592288" cy="369332"/>
+          </a:xfrm>
+          <a:prstGeom prst="rect">
+            <a:avLst/>
+          </a:prstGeom>
+          <a:noFill/>
+        </p:spPr>
+        <p:txBody>
+          <a:bodyPr wrap="square" rtlCol="1">
+            <a:spAutoFit/>
+          </a:bodyPr>
+          <a:lstStyle/>
+          <a:p>
+            <a:pPr algn="ctr"/>
+            <a:r>
+              <a:rPr lang="en-US" dirty="0" smtClean="0"/>
+              <a:t>With PT</a:t>
+            </a:r>
+            <a:endParaRPr lang="he-IL" dirty="0"/>
+          </a:p>
+        </p:txBody>
+      </p:sp>
+      <p:sp>
+        <p:nvSpPr>
+          <p:cNvPr id="6" name="TextBox 5"/>
+          <p:cNvSpPr txBox="1"/>
+          <p:nvPr/>
+        </p:nvSpPr>
+        <p:spPr>
+          <a:xfrm>
+            <a:off x="899592" y="5013176"/>
+            <a:ext cx="2592288" cy="369332"/>
+          </a:xfrm>
+          <a:prstGeom prst="rect">
+            <a:avLst/>
+          </a:prstGeom>
+          <a:noFill/>
+        </p:spPr>
+        <p:txBody>
+          <a:bodyPr wrap="square" rtlCol="1">
+            <a:spAutoFit/>
+          </a:bodyPr>
+          <a:lstStyle/>
+          <a:p>
+            <a:pPr algn="ctr"/>
+            <a:r>
+              <a:rPr lang="en-US" dirty="0" smtClean="0"/>
+              <a:t>Without PT</a:t>
+            </a:r>
+            <a:endParaRPr lang="he-IL" dirty="0"/>
+          </a:p>
+        </p:txBody>
+      </p:sp>
+    </p:spTree>
+    <p:extLst>
+      <p:ext uri="{BB962C8B-B14F-4D97-AF65-F5344CB8AC3E}">
+        <p14:creationId xmlns:p14="http://schemas.microsoft.com/office/powerpoint/2010/main" val="3542822798"/>
+      </p:ext>
+    </p:extLst>
+  </p:cSld>
+  <p:clrMapOvr>
+    <a:masterClrMapping/>
+  </p:clrMapOvr>
+  <p:timing>
+    <p:tnLst>
+      <p:par>
+        <p:cTn id="1" dur="indefinite" restart="never" nodeType="tmRoot"/>
+      </p:par>
+    </p:tnLst>
+  </p:timing>
+</p:sld>
+</file>
+
+<file path=ppt/slides/slide11.xml><?xml version="1.0" encoding="utf-8"?>
+<p:sld xmlns:a="http://schemas.openxmlformats.org/drawingml/2006/main" xmlns:r="http://schemas.openxmlformats.org/officeDocument/2006/relationships" xmlns:p="http://schemas.openxmlformats.org/presentationml/2006/main">
+  <p:cSld>
+    <p:spTree>
+      <p:nvGrpSpPr>
+        <p:cNvPr id="1" name=""/>
+        <p:cNvGrpSpPr/>
+        <p:nvPr/>
+      </p:nvGrpSpPr>
+      <p:grpSpPr>
+        <a:xfrm>
+          <a:off x="0" y="0"/>
+          <a:ext cx="0" cy="0"/>
+          <a:chOff x="0" y="0"/>
+          <a:chExt cx="0" cy="0"/>
+        </a:xfrm>
+      </p:grpSpPr>
+      <p:pic>
+        <p:nvPicPr>
           <p:cNvPr id="3077" name="Picture 5"/>
           <p:cNvPicPr>
             <a:picLocks noChangeAspect="1" noChangeArrowheads="1"/>
@@ -4283,7 +4551,7 @@
 </p:sld>
 </file>
 
-<file path=ppt/slides/slide11.xml><?xml version="1.0" encoding="utf-8"?>
+<file path=ppt/slides/slide12.xml><?xml version="1.0" encoding="utf-8"?>
 <p:sld xmlns:a="http://schemas.openxmlformats.org/drawingml/2006/main" xmlns:r="http://schemas.openxmlformats.org/officeDocument/2006/relationships" xmlns:p="http://schemas.openxmlformats.org/presentationml/2006/main">
   <p:cSld>
     <p:spTree>
@@ -4384,7 +4652,7 @@
 </p:sld>
 </file>
 
-<file path=ppt/slides/slide12.xml><?xml version="1.0" encoding="utf-8"?>
+<file path=ppt/slides/slide13.xml><?xml version="1.0" encoding="utf-8"?>
 <p:sld xmlns:a="http://schemas.openxmlformats.org/drawingml/2006/main" xmlns:r="http://schemas.openxmlformats.org/officeDocument/2006/relationships" xmlns:p="http://schemas.openxmlformats.org/presentationml/2006/main">
   <p:cSld>
     <p:spTree>
@@ -4649,7 +4917,7 @@
 </p:sld>
 </file>
 
-<file path=ppt/slides/slide13.xml><?xml version="1.0" encoding="utf-8"?>
+<file path=ppt/slides/slide14.xml><?xml version="1.0" encoding="utf-8"?>
 <p:sld xmlns:a="http://schemas.openxmlformats.org/drawingml/2006/main" xmlns:r="http://schemas.openxmlformats.org/officeDocument/2006/relationships" xmlns:p="http://schemas.openxmlformats.org/presentationml/2006/main">
   <p:cSld>
     <p:spTree>
@@ -4743,7 +5011,7 @@
 </p:sld>
 </file>
 
-<file path=ppt/slides/slide14.xml><?xml version="1.0" encoding="utf-8"?>
+<file path=ppt/slides/slide15.xml><?xml version="1.0" encoding="utf-8"?>
 <p:sld xmlns:a="http://schemas.openxmlformats.org/drawingml/2006/main" xmlns:r="http://schemas.openxmlformats.org/officeDocument/2006/relationships" xmlns:p="http://schemas.openxmlformats.org/presentationml/2006/main">
   <p:cSld>
     <p:spTree>
@@ -4837,7 +5105,7 @@
 </p:sld>
 </file>
 
-<file path=ppt/slides/slide15.xml><?xml version="1.0" encoding="utf-8"?>
+<file path=ppt/slides/slide16.xml><?xml version="1.0" encoding="utf-8"?>
 <p:sld xmlns:a="http://schemas.openxmlformats.org/drawingml/2006/main" xmlns:r="http://schemas.openxmlformats.org/officeDocument/2006/relationships" xmlns:p="http://schemas.openxmlformats.org/presentationml/2006/main">
   <p:cSld>
     <p:spTree>
@@ -5102,7 +5370,7 @@
 </p:sld>
 </file>
 
-<file path=ppt/slides/slide16.xml><?xml version="1.0" encoding="utf-8"?>
+<file path=ppt/slides/slide17.xml><?xml version="1.0" encoding="utf-8"?>
 <p:sld xmlns:a="http://schemas.openxmlformats.org/drawingml/2006/main" xmlns:r="http://schemas.openxmlformats.org/officeDocument/2006/relationships" xmlns:p="http://schemas.openxmlformats.org/presentationml/2006/main">
   <p:cSld>
     <p:spTree>
@@ -5196,7 +5464,7 @@
 </p:sld>
 </file>
 
-<file path=ppt/slides/slide17.xml><?xml version="1.0" encoding="utf-8"?>
+<file path=ppt/slides/slide18.xml><?xml version="1.0" encoding="utf-8"?>
 <p:sld xmlns:a="http://schemas.openxmlformats.org/drawingml/2006/main" xmlns:r="http://schemas.openxmlformats.org/officeDocument/2006/relationships" xmlns:p="http://schemas.openxmlformats.org/presentationml/2006/main">
   <p:cSld>
     <p:spTree>
@@ -5290,7 +5558,7 @@
 </p:sld>
 </file>
 
-<file path=ppt/slides/slide18.xml><?xml version="1.0" encoding="utf-8"?>
+<file path=ppt/slides/slide19.xml><?xml version="1.0" encoding="utf-8"?>
 <p:sld xmlns:a="http://schemas.openxmlformats.org/drawingml/2006/main" xmlns:r="http://schemas.openxmlformats.org/officeDocument/2006/relationships" xmlns:p="http://schemas.openxmlformats.org/presentationml/2006/main">
   <p:cSld>
     <p:spTree>
@@ -5552,100 +5820,6 @@
       </p:par>
     </p:tnLst>
   </p:timing>
-</p:sld>
-</file>
-
-<file path=ppt/slides/slide19.xml><?xml version="1.0" encoding="utf-8"?>
-<p:sld xmlns:a="http://schemas.openxmlformats.org/drawingml/2006/main" xmlns:r="http://schemas.openxmlformats.org/officeDocument/2006/relationships" xmlns:p="http://schemas.openxmlformats.org/presentationml/2006/main">
-  <p:cSld>
-    <p:spTree>
-      <p:nvGrpSpPr>
-        <p:cNvPr id="1" name=""/>
-        <p:cNvGrpSpPr/>
-        <p:nvPr/>
-      </p:nvGrpSpPr>
-      <p:grpSpPr>
-        <a:xfrm>
-          <a:off x="0" y="0"/>
-          <a:ext cx="0" cy="0"/>
-          <a:chOff x="0" y="0"/>
-          <a:chExt cx="0" cy="0"/>
-        </a:xfrm>
-      </p:grpSpPr>
-      <p:pic>
-        <p:nvPicPr>
-          <p:cNvPr id="11266" name="Picture 2"/>
-          <p:cNvPicPr>
-            <a:picLocks noChangeAspect="1" noChangeArrowheads="1"/>
-          </p:cNvPicPr>
-          <p:nvPr/>
-        </p:nvPicPr>
-        <p:blipFill>
-          <a:blip r:embed="rId2">
-            <a:extLst>
-              <a:ext uri="{28A0092B-C50C-407E-A947-70E740481C1C}">
-                <a14:useLocalDpi xmlns:a14="http://schemas.microsoft.com/office/drawing/2010/main" val="0"/>
-              </a:ext>
-            </a:extLst>
-          </a:blip>
-          <a:srcRect/>
-          <a:stretch>
-            <a:fillRect/>
-          </a:stretch>
-        </p:blipFill>
-        <p:spPr bwMode="auto">
-          <a:xfrm>
-            <a:off x="-756592" y="1508386"/>
-            <a:ext cx="10125273" cy="4822564"/>
-          </a:xfrm>
-          <a:prstGeom prst="rect">
-            <a:avLst/>
-          </a:prstGeom>
-          <a:noFill/>
-          <a:ln>
-            <a:noFill/>
-          </a:ln>
-          <a:effectLst/>
-          <a:extLst>
-            <a:ext uri="{909E8E84-426E-40DD-AFC4-6F175D3DCCD1}">
-              <a14:hiddenFill xmlns:a14="http://schemas.microsoft.com/office/drawing/2010/main">
-                <a:solidFill>
-                  <a:schemeClr val="accent1"/>
-                </a:solidFill>
-              </a14:hiddenFill>
-            </a:ext>
-            <a:ext uri="{91240B29-F687-4F45-9708-019B960494DF}">
-              <a14:hiddenLine xmlns:a14="http://schemas.microsoft.com/office/drawing/2010/main" w="9525">
-                <a:solidFill>
-                  <a:schemeClr val="tx1"/>
-                </a:solidFill>
-                <a:miter lim="800000"/>
-                <a:headEnd/>
-                <a:tailEnd/>
-              </a14:hiddenLine>
-            </a:ext>
-            <a:ext uri="{AF507438-7753-43E0-B8FC-AC1667EBCBE1}">
-              <a14:hiddenEffects xmlns:a14="http://schemas.microsoft.com/office/drawing/2010/main">
-                <a:effectLst>
-                  <a:outerShdw dist="35921" dir="2700000" algn="ctr" rotWithShape="0">
-                    <a:schemeClr val="bg2"/>
-                  </a:outerShdw>
-                </a:effectLst>
-              </a14:hiddenEffects>
-            </a:ext>
-          </a:extLst>
-        </p:spPr>
-      </p:pic>
-    </p:spTree>
-    <p:extLst>
-      <p:ext uri="{BB962C8B-B14F-4D97-AF65-F5344CB8AC3E}">
-        <p14:creationId xmlns:p14="http://schemas.microsoft.com/office/powerpoint/2010/main" val="1200731675"/>
-      </p:ext>
-    </p:extLst>
-  </p:cSld>
-  <p:clrMapOvr>
-    <a:masterClrMapping/>
-  </p:clrMapOvr>
 </p:sld>
 </file>
 
@@ -5801,6 +5975,100 @@
       </p:grpSpPr>
       <p:pic>
         <p:nvPicPr>
+          <p:cNvPr id="11266" name="Picture 2"/>
+          <p:cNvPicPr>
+            <a:picLocks noChangeAspect="1" noChangeArrowheads="1"/>
+          </p:cNvPicPr>
+          <p:nvPr/>
+        </p:nvPicPr>
+        <p:blipFill>
+          <a:blip r:embed="rId2">
+            <a:extLst>
+              <a:ext uri="{28A0092B-C50C-407E-A947-70E740481C1C}">
+                <a14:useLocalDpi xmlns:a14="http://schemas.microsoft.com/office/drawing/2010/main" val="0"/>
+              </a:ext>
+            </a:extLst>
+          </a:blip>
+          <a:srcRect/>
+          <a:stretch>
+            <a:fillRect/>
+          </a:stretch>
+        </p:blipFill>
+        <p:spPr bwMode="auto">
+          <a:xfrm>
+            <a:off x="-756592" y="1508386"/>
+            <a:ext cx="10125273" cy="4822564"/>
+          </a:xfrm>
+          <a:prstGeom prst="rect">
+            <a:avLst/>
+          </a:prstGeom>
+          <a:noFill/>
+          <a:ln>
+            <a:noFill/>
+          </a:ln>
+          <a:effectLst/>
+          <a:extLst>
+            <a:ext uri="{909E8E84-426E-40DD-AFC4-6F175D3DCCD1}">
+              <a14:hiddenFill xmlns:a14="http://schemas.microsoft.com/office/drawing/2010/main">
+                <a:solidFill>
+                  <a:schemeClr val="accent1"/>
+                </a:solidFill>
+              </a14:hiddenFill>
+            </a:ext>
+            <a:ext uri="{91240B29-F687-4F45-9708-019B960494DF}">
+              <a14:hiddenLine xmlns:a14="http://schemas.microsoft.com/office/drawing/2010/main" w="9525">
+                <a:solidFill>
+                  <a:schemeClr val="tx1"/>
+                </a:solidFill>
+                <a:miter lim="800000"/>
+                <a:headEnd/>
+                <a:tailEnd/>
+              </a14:hiddenLine>
+            </a:ext>
+            <a:ext uri="{AF507438-7753-43E0-B8FC-AC1667EBCBE1}">
+              <a14:hiddenEffects xmlns:a14="http://schemas.microsoft.com/office/drawing/2010/main">
+                <a:effectLst>
+                  <a:outerShdw dist="35921" dir="2700000" algn="ctr" rotWithShape="0">
+                    <a:schemeClr val="bg2"/>
+                  </a:outerShdw>
+                </a:effectLst>
+              </a14:hiddenEffects>
+            </a:ext>
+          </a:extLst>
+        </p:spPr>
+      </p:pic>
+    </p:spTree>
+    <p:extLst>
+      <p:ext uri="{BB962C8B-B14F-4D97-AF65-F5344CB8AC3E}">
+        <p14:creationId xmlns:p14="http://schemas.microsoft.com/office/powerpoint/2010/main" val="1200731675"/>
+      </p:ext>
+    </p:extLst>
+  </p:cSld>
+  <p:clrMapOvr>
+    <a:masterClrMapping/>
+  </p:clrMapOvr>
+</p:sld>
+</file>
+
+<file path=ppt/slides/slide21.xml><?xml version="1.0" encoding="utf-8"?>
+<p:sld xmlns:a="http://schemas.openxmlformats.org/drawingml/2006/main" xmlns:r="http://schemas.openxmlformats.org/officeDocument/2006/relationships" xmlns:p="http://schemas.openxmlformats.org/presentationml/2006/main">
+  <p:cSld>
+    <p:spTree>
+      <p:nvGrpSpPr>
+        <p:cNvPr id="1" name=""/>
+        <p:cNvGrpSpPr/>
+        <p:nvPr/>
+      </p:nvGrpSpPr>
+      <p:grpSpPr>
+        <a:xfrm>
+          <a:off x="0" y="0"/>
+          <a:ext cx="0" cy="0"/>
+          <a:chOff x="0" y="0"/>
+          <a:chExt cx="0" cy="0"/>
+        </a:xfrm>
+      </p:grpSpPr>
+      <p:pic>
+        <p:nvPicPr>
           <p:cNvPr id="12290" name="Picture 2"/>
           <p:cNvPicPr>
             <a:picLocks noChangeAspect="1" noChangeArrowheads="1"/>
@@ -5867,6 +6135,345 @@
     <p:extLst>
       <p:ext uri="{BB962C8B-B14F-4D97-AF65-F5344CB8AC3E}">
         <p14:creationId xmlns:p14="http://schemas.microsoft.com/office/powerpoint/2010/main" val="3872680647"/>
+      </p:ext>
+    </p:extLst>
+  </p:cSld>
+  <p:clrMapOvr>
+    <a:masterClrMapping/>
+  </p:clrMapOvr>
+</p:sld>
+</file>
+
+<file path=ppt/slides/slide22.xml><?xml version="1.0" encoding="utf-8"?>
+<p:sld xmlns:a="http://schemas.openxmlformats.org/drawingml/2006/main" xmlns:r="http://schemas.openxmlformats.org/officeDocument/2006/relationships" xmlns:p="http://schemas.openxmlformats.org/presentationml/2006/main">
+  <p:cSld>
+    <p:spTree>
+      <p:nvGrpSpPr>
+        <p:cNvPr id="1" name=""/>
+        <p:cNvGrpSpPr/>
+        <p:nvPr/>
+      </p:nvGrpSpPr>
+      <p:grpSpPr>
+        <a:xfrm>
+          <a:off x="0" y="0"/>
+          <a:ext cx="0" cy="0"/>
+          <a:chOff x="0" y="0"/>
+          <a:chExt cx="0" cy="0"/>
+        </a:xfrm>
+      </p:grpSpPr>
+      <p:sp>
+        <p:nvSpPr>
+          <p:cNvPr id="2" name="כותרת 1"/>
+          <p:cNvSpPr>
+            <a:spLocks noGrp="1"/>
+          </p:cNvSpPr>
+          <p:nvPr>
+            <p:ph type="ctrTitle"/>
+          </p:nvPr>
+        </p:nvSpPr>
+        <p:spPr/>
+        <p:txBody>
+          <a:bodyPr/>
+          <a:lstStyle/>
+          <a:p>
+            <a:r>
+              <a:rPr lang="en-US" dirty="0" smtClean="0"/>
+              <a:t>Fourier domain</a:t>
+            </a:r>
+            <a:endParaRPr lang="he-IL" dirty="0"/>
+          </a:p>
+        </p:txBody>
+      </p:sp>
+    </p:spTree>
+    <p:extLst>
+      <p:ext uri="{BB962C8B-B14F-4D97-AF65-F5344CB8AC3E}">
+        <p14:creationId xmlns:p14="http://schemas.microsoft.com/office/powerpoint/2010/main" val="1618747314"/>
+      </p:ext>
+    </p:extLst>
+  </p:cSld>
+  <p:clrMapOvr>
+    <a:masterClrMapping/>
+  </p:clrMapOvr>
+</p:sld>
+</file>
+
+<file path=ppt/slides/slide23.xml><?xml version="1.0" encoding="utf-8"?>
+<p:sld xmlns:a="http://schemas.openxmlformats.org/drawingml/2006/main" xmlns:r="http://schemas.openxmlformats.org/officeDocument/2006/relationships" xmlns:p="http://schemas.openxmlformats.org/presentationml/2006/main">
+  <p:cSld>
+    <p:spTree>
+      <p:nvGrpSpPr>
+        <p:cNvPr id="1" name=""/>
+        <p:cNvGrpSpPr/>
+        <p:nvPr/>
+      </p:nvGrpSpPr>
+      <p:grpSpPr>
+        <a:xfrm>
+          <a:off x="0" y="0"/>
+          <a:ext cx="0" cy="0"/>
+          <a:chOff x="0" y="0"/>
+          <a:chExt cx="0" cy="0"/>
+        </a:xfrm>
+      </p:grpSpPr>
+      <p:pic>
+        <p:nvPicPr>
+          <p:cNvPr id="2050" name="Picture 2"/>
+          <p:cNvPicPr>
+            <a:picLocks noChangeAspect="1" noChangeArrowheads="1"/>
+          </p:cNvPicPr>
+          <p:nvPr/>
+        </p:nvPicPr>
+        <p:blipFill>
+          <a:blip r:embed="rId2" cstate="print">
+            <a:extLst>
+              <a:ext uri="{28A0092B-C50C-407E-A947-70E740481C1C}">
+                <a14:useLocalDpi xmlns:a14="http://schemas.microsoft.com/office/drawing/2010/main" val="0"/>
+              </a:ext>
+            </a:extLst>
+          </a:blip>
+          <a:srcRect/>
+          <a:stretch>
+            <a:fillRect/>
+          </a:stretch>
+        </p:blipFill>
+        <p:spPr bwMode="auto">
+          <a:xfrm>
+            <a:off x="-34167" y="332656"/>
+            <a:ext cx="4842817" cy="3352720"/>
+          </a:xfrm>
+          <a:prstGeom prst="rect">
+            <a:avLst/>
+          </a:prstGeom>
+          <a:noFill/>
+          <a:ln>
+            <a:noFill/>
+          </a:ln>
+          <a:effectLst/>
+          <a:extLst>
+            <a:ext uri="{909E8E84-426E-40DD-AFC4-6F175D3DCCD1}">
+              <a14:hiddenFill xmlns:a14="http://schemas.microsoft.com/office/drawing/2010/main">
+                <a:solidFill>
+                  <a:schemeClr val="accent1"/>
+                </a:solidFill>
+              </a14:hiddenFill>
+            </a:ext>
+            <a:ext uri="{91240B29-F687-4F45-9708-019B960494DF}">
+              <a14:hiddenLine xmlns:a14="http://schemas.microsoft.com/office/drawing/2010/main" w="9525">
+                <a:solidFill>
+                  <a:schemeClr val="tx1"/>
+                </a:solidFill>
+                <a:miter lim="800000"/>
+                <a:headEnd/>
+                <a:tailEnd/>
+              </a14:hiddenLine>
+            </a:ext>
+            <a:ext uri="{AF507438-7753-43E0-B8FC-AC1667EBCBE1}">
+              <a14:hiddenEffects xmlns:a14="http://schemas.microsoft.com/office/drawing/2010/main">
+                <a:effectLst>
+                  <a:outerShdw dist="35921" dir="2700000" algn="ctr" rotWithShape="0">
+                    <a:schemeClr val="bg2"/>
+                  </a:outerShdw>
+                </a:effectLst>
+              </a14:hiddenEffects>
+            </a:ext>
+          </a:extLst>
+        </p:spPr>
+      </p:pic>
+      <p:pic>
+        <p:nvPicPr>
+          <p:cNvPr id="2053" name="Picture 5"/>
+          <p:cNvPicPr>
+            <a:picLocks noChangeAspect="1" noChangeArrowheads="1"/>
+          </p:cNvPicPr>
+          <p:nvPr/>
+        </p:nvPicPr>
+        <p:blipFill>
+          <a:blip r:embed="rId3" cstate="print">
+            <a:extLst>
+              <a:ext uri="{28A0092B-C50C-407E-A947-70E740481C1C}">
+                <a14:useLocalDpi xmlns:a14="http://schemas.microsoft.com/office/drawing/2010/main" val="0"/>
+              </a:ext>
+            </a:extLst>
+          </a:blip>
+          <a:srcRect/>
+          <a:stretch>
+            <a:fillRect/>
+          </a:stretch>
+        </p:blipFill>
+        <p:spPr bwMode="auto">
+          <a:xfrm>
+            <a:off x="5436096" y="3889678"/>
+            <a:ext cx="3707904" cy="2968322"/>
+          </a:xfrm>
+          <a:prstGeom prst="rect">
+            <a:avLst/>
+          </a:prstGeom>
+          <a:noFill/>
+          <a:ln>
+            <a:noFill/>
+          </a:ln>
+          <a:effectLst/>
+          <a:extLst>
+            <a:ext uri="{909E8E84-426E-40DD-AFC4-6F175D3DCCD1}">
+              <a14:hiddenFill xmlns:a14="http://schemas.microsoft.com/office/drawing/2010/main">
+                <a:solidFill>
+                  <a:schemeClr val="accent1"/>
+                </a:solidFill>
+              </a14:hiddenFill>
+            </a:ext>
+            <a:ext uri="{91240B29-F687-4F45-9708-019B960494DF}">
+              <a14:hiddenLine xmlns:a14="http://schemas.microsoft.com/office/drawing/2010/main" w="9525">
+                <a:solidFill>
+                  <a:schemeClr val="tx1"/>
+                </a:solidFill>
+                <a:miter lim="800000"/>
+                <a:headEnd/>
+                <a:tailEnd/>
+              </a14:hiddenLine>
+            </a:ext>
+            <a:ext uri="{AF507438-7753-43E0-B8FC-AC1667EBCBE1}">
+              <a14:hiddenEffects xmlns:a14="http://schemas.microsoft.com/office/drawing/2010/main">
+                <a:effectLst>
+                  <a:outerShdw dist="35921" dir="2700000" algn="ctr" rotWithShape="0">
+                    <a:schemeClr val="bg2"/>
+                  </a:outerShdw>
+                </a:effectLst>
+              </a14:hiddenEffects>
+            </a:ext>
+          </a:extLst>
+        </p:spPr>
+      </p:pic>
+      <p:pic>
+        <p:nvPicPr>
+          <p:cNvPr id="2054" name="Picture 6"/>
+          <p:cNvPicPr>
+            <a:picLocks noChangeAspect="1" noChangeArrowheads="1"/>
+          </p:cNvPicPr>
+          <p:nvPr/>
+        </p:nvPicPr>
+        <p:blipFill>
+          <a:blip r:embed="rId4" cstate="print">
+            <a:extLst>
+              <a:ext uri="{28A0092B-C50C-407E-A947-70E740481C1C}">
+                <a14:useLocalDpi xmlns:a14="http://schemas.microsoft.com/office/drawing/2010/main" val="0"/>
+              </a:ext>
+            </a:extLst>
+          </a:blip>
+          <a:srcRect/>
+          <a:stretch>
+            <a:fillRect/>
+          </a:stretch>
+        </p:blipFill>
+        <p:spPr bwMode="auto">
+          <a:xfrm>
+            <a:off x="4973176" y="739319"/>
+            <a:ext cx="4341351" cy="3116957"/>
+          </a:xfrm>
+          <a:prstGeom prst="rect">
+            <a:avLst/>
+          </a:prstGeom>
+          <a:noFill/>
+          <a:ln>
+            <a:noFill/>
+          </a:ln>
+          <a:effectLst/>
+          <a:extLst>
+            <a:ext uri="{909E8E84-426E-40DD-AFC4-6F175D3DCCD1}">
+              <a14:hiddenFill xmlns:a14="http://schemas.microsoft.com/office/drawing/2010/main">
+                <a:solidFill>
+                  <a:schemeClr val="accent1"/>
+                </a:solidFill>
+              </a14:hiddenFill>
+            </a:ext>
+            <a:ext uri="{91240B29-F687-4F45-9708-019B960494DF}">
+              <a14:hiddenLine xmlns:a14="http://schemas.microsoft.com/office/drawing/2010/main" w="9525">
+                <a:solidFill>
+                  <a:schemeClr val="tx1"/>
+                </a:solidFill>
+                <a:miter lim="800000"/>
+                <a:headEnd/>
+                <a:tailEnd/>
+              </a14:hiddenLine>
+            </a:ext>
+            <a:ext uri="{AF507438-7753-43E0-B8FC-AC1667EBCBE1}">
+              <a14:hiddenEffects xmlns:a14="http://schemas.microsoft.com/office/drawing/2010/main">
+                <a:effectLst>
+                  <a:outerShdw dist="35921" dir="2700000" algn="ctr" rotWithShape="0">
+                    <a:schemeClr val="bg2"/>
+                  </a:outerShdw>
+                </a:effectLst>
+              </a14:hiddenEffects>
+            </a:ext>
+          </a:extLst>
+        </p:spPr>
+      </p:pic>
+      <p:pic>
+        <p:nvPicPr>
+          <p:cNvPr id="2055" name="Picture 7"/>
+          <p:cNvPicPr>
+            <a:picLocks noChangeAspect="1" noChangeArrowheads="1"/>
+          </p:cNvPicPr>
+          <p:nvPr/>
+        </p:nvPicPr>
+        <p:blipFill>
+          <a:blip r:embed="rId5" cstate="print">
+            <a:extLst>
+              <a:ext uri="{28A0092B-C50C-407E-A947-70E740481C1C}">
+                <a14:useLocalDpi xmlns:a14="http://schemas.microsoft.com/office/drawing/2010/main" val="0"/>
+              </a:ext>
+            </a:extLst>
+          </a:blip>
+          <a:srcRect/>
+          <a:stretch>
+            <a:fillRect/>
+          </a:stretch>
+        </p:blipFill>
+        <p:spPr bwMode="auto">
+          <a:xfrm>
+            <a:off x="175205" y="3714256"/>
+            <a:ext cx="4900851" cy="3143743"/>
+          </a:xfrm>
+          <a:prstGeom prst="rect">
+            <a:avLst/>
+          </a:prstGeom>
+          <a:noFill/>
+          <a:ln>
+            <a:noFill/>
+          </a:ln>
+          <a:effectLst/>
+          <a:extLst>
+            <a:ext uri="{909E8E84-426E-40DD-AFC4-6F175D3DCCD1}">
+              <a14:hiddenFill xmlns:a14="http://schemas.microsoft.com/office/drawing/2010/main">
+                <a:solidFill>
+                  <a:schemeClr val="accent1"/>
+                </a:solidFill>
+              </a14:hiddenFill>
+            </a:ext>
+            <a:ext uri="{91240B29-F687-4F45-9708-019B960494DF}">
+              <a14:hiddenLine xmlns:a14="http://schemas.microsoft.com/office/drawing/2010/main" w="9525">
+                <a:solidFill>
+                  <a:schemeClr val="tx1"/>
+                </a:solidFill>
+                <a:miter lim="800000"/>
+                <a:headEnd/>
+                <a:tailEnd/>
+              </a14:hiddenLine>
+            </a:ext>
+            <a:ext uri="{AF507438-7753-43E0-B8FC-AC1667EBCBE1}">
+              <a14:hiddenEffects xmlns:a14="http://schemas.microsoft.com/office/drawing/2010/main">
+                <a:effectLst>
+                  <a:outerShdw dist="35921" dir="2700000" algn="ctr" rotWithShape="0">
+                    <a:schemeClr val="bg2"/>
+                  </a:outerShdw>
+                </a:effectLst>
+              </a14:hiddenEffects>
+            </a:ext>
+          </a:extLst>
+        </p:spPr>
+      </p:pic>
+    </p:spTree>
+    <p:extLst>
+      <p:ext uri="{BB962C8B-B14F-4D97-AF65-F5344CB8AC3E}">
+        <p14:creationId xmlns:p14="http://schemas.microsoft.com/office/powerpoint/2010/main" val="3633604388"/>
       </p:ext>
     </p:extLst>
   </p:cSld>
@@ -6207,13 +6814,7 @@
               <a:rPr lang="en-US" sz="2700" b="1" dirty="0" smtClean="0">
                 <a:cs typeface="+mn-cs"/>
               </a:rPr>
-              <a:t>Bad </a:t>
-            </a:r>
-            <a:r>
-              <a:rPr lang="en-US" sz="2700" b="1" dirty="0" smtClean="0">
-                <a:cs typeface="+mn-cs"/>
-              </a:rPr>
-              <a:t>Electrodes, trials &lt; 500</a:t>
+              <a:t>Bad Electrodes, trials &lt; 500</a:t>
             </a:r>
             <a:endParaRPr lang="he-IL" sz="2700" dirty="0">
               <a:cs typeface="+mn-cs"/>
@@ -6574,15 +7175,7 @@
             <a:pPr algn="l"/>
             <a:r>
               <a:rPr lang="en-US" sz="1400" dirty="0" smtClean="0"/>
-              <a:t>Subject </a:t>
-            </a:r>
-            <a:r>
-              <a:rPr lang="en-US" sz="1400" dirty="0" smtClean="0"/>
-              <a:t>c02 </a:t>
-            </a:r>
-            <a:r>
-              <a:rPr lang="en-US" sz="1400" dirty="0" smtClean="0"/>
-              <a:t>old good electrodes (32)</a:t>
+              <a:t>Subject c02 old good electrodes (32)</a:t>
             </a:r>
             <a:endParaRPr lang="he-IL" sz="1400" dirty="0"/>
           </a:p>
@@ -6914,45 +7507,214 @@
       </p:grpSpPr>
       <p:sp>
         <p:nvSpPr>
-          <p:cNvPr id="2" name="כותרת 1"/>
-          <p:cNvSpPr>
-            <a:spLocks noGrp="1"/>
-          </p:cNvSpPr>
-          <p:nvPr>
-            <p:ph type="ctrTitle"/>
-          </p:nvPr>
+          <p:cNvPr id="5" name="TextBox 4"/>
+          <p:cNvSpPr txBox="1"/>
+          <p:nvPr/>
         </p:nvSpPr>
         <p:spPr>
           <a:xfrm>
-            <a:off x="1043608" y="1700808"/>
-            <a:ext cx="7406640" cy="1472184"/>
-          </a:xfrm>
-        </p:spPr>
-        <p:txBody>
-          <a:bodyPr>
-            <a:noAutofit/>
+            <a:off x="130311" y="836712"/>
+            <a:ext cx="4176464" cy="307777"/>
+          </a:xfrm>
+          <a:prstGeom prst="rect">
+            <a:avLst/>
+          </a:prstGeom>
+          <a:noFill/>
+        </p:spPr>
+        <p:txBody>
+          <a:bodyPr wrap="square" rtlCol="1">
+            <a:spAutoFit/>
           </a:bodyPr>
           <a:lstStyle/>
           <a:p>
-            <a:pPr algn="ctr"/>
-            <a:r>
-              <a:rPr lang="en-US" sz="8000" b="1" dirty="0" smtClean="0">
-                <a:latin typeface="Times New Roman" panose="02020603050405020304" pitchFamily="18" charset="0"/>
-                <a:cs typeface="Times New Roman" panose="02020603050405020304" pitchFamily="18" charset="0"/>
-              </a:rPr>
-              <a:t>Confusion Matrix</a:t>
-            </a:r>
-            <a:endParaRPr lang="he-IL" sz="8000" b="1" dirty="0">
-              <a:latin typeface="Times New Roman" panose="02020603050405020304" pitchFamily="18" charset="0"/>
-              <a:cs typeface="Times New Roman" panose="02020603050405020304" pitchFamily="18" charset="0"/>
-            </a:endParaRPr>
-          </a:p>
-        </p:txBody>
-      </p:sp>
+            <a:pPr algn="l"/>
+            <a:r>
+              <a:rPr lang="en-US" sz="1400" dirty="0" smtClean="0"/>
+              <a:t>Subject </a:t>
+            </a:r>
+            <a:r>
+              <a:rPr lang="en-US" sz="1400" dirty="0" smtClean="0"/>
+              <a:t>c03 </a:t>
+            </a:r>
+            <a:r>
+              <a:rPr lang="en-US" sz="1400" dirty="0" smtClean="0"/>
+              <a:t>old good electrodes (32)</a:t>
+            </a:r>
+            <a:endParaRPr lang="he-IL" sz="1400" dirty="0"/>
+          </a:p>
+        </p:txBody>
+      </p:sp>
+      <p:sp>
+        <p:nvSpPr>
+          <p:cNvPr id="7" name="TextBox 6"/>
+          <p:cNvSpPr txBox="1"/>
+          <p:nvPr/>
+        </p:nvSpPr>
+        <p:spPr>
+          <a:xfrm>
+            <a:off x="5362713" y="836712"/>
+            <a:ext cx="3612349" cy="307777"/>
+          </a:xfrm>
+          <a:prstGeom prst="rect">
+            <a:avLst/>
+          </a:prstGeom>
+          <a:noFill/>
+        </p:spPr>
+        <p:txBody>
+          <a:bodyPr wrap="square" rtlCol="1">
+            <a:spAutoFit/>
+          </a:bodyPr>
+          <a:lstStyle/>
+          <a:p>
+            <a:pPr algn="l"/>
+            <a:r>
+              <a:rPr lang="en-US" sz="1400" dirty="0" smtClean="0"/>
+              <a:t>Subject </a:t>
+            </a:r>
+            <a:r>
+              <a:rPr lang="en-US" sz="1400" dirty="0" smtClean="0"/>
+              <a:t>c03 </a:t>
+            </a:r>
+            <a:r>
+              <a:rPr lang="en-US" sz="1400" dirty="0" smtClean="0"/>
+              <a:t>all his good electrodes (63)</a:t>
+            </a:r>
+            <a:endParaRPr lang="he-IL" sz="1400" dirty="0"/>
+          </a:p>
+        </p:txBody>
+      </p:sp>
+      <p:pic>
+        <p:nvPicPr>
+          <p:cNvPr id="1026" name="Picture 2"/>
+          <p:cNvPicPr>
+            <a:picLocks noChangeAspect="1" noChangeArrowheads="1"/>
+          </p:cNvPicPr>
+          <p:nvPr/>
+        </p:nvPicPr>
+        <p:blipFill>
+          <a:blip r:embed="rId2">
+            <a:extLst>
+              <a:ext uri="{28A0092B-C50C-407E-A947-70E740481C1C}">
+                <a14:useLocalDpi xmlns:a14="http://schemas.microsoft.com/office/drawing/2010/main" val="0"/>
+              </a:ext>
+            </a:extLst>
+          </a:blip>
+          <a:srcRect/>
+          <a:stretch>
+            <a:fillRect/>
+          </a:stretch>
+        </p:blipFill>
+        <p:spPr bwMode="auto">
+          <a:xfrm>
+            <a:off x="-108520" y="1772815"/>
+            <a:ext cx="4937581" cy="3701715"/>
+          </a:xfrm>
+          <a:prstGeom prst="rect">
+            <a:avLst/>
+          </a:prstGeom>
+          <a:noFill/>
+          <a:ln>
+            <a:noFill/>
+          </a:ln>
+          <a:effectLst/>
+          <a:extLst>
+            <a:ext uri="{909E8E84-426E-40DD-AFC4-6F175D3DCCD1}">
+              <a14:hiddenFill xmlns:a14="http://schemas.microsoft.com/office/drawing/2010/main">
+                <a:solidFill>
+                  <a:schemeClr val="accent1"/>
+                </a:solidFill>
+              </a14:hiddenFill>
+            </a:ext>
+            <a:ext uri="{91240B29-F687-4F45-9708-019B960494DF}">
+              <a14:hiddenLine xmlns:a14="http://schemas.microsoft.com/office/drawing/2010/main" w="9525">
+                <a:solidFill>
+                  <a:schemeClr val="tx1"/>
+                </a:solidFill>
+                <a:miter lim="800000"/>
+                <a:headEnd/>
+                <a:tailEnd/>
+              </a14:hiddenLine>
+            </a:ext>
+            <a:ext uri="{AF507438-7753-43E0-B8FC-AC1667EBCBE1}">
+              <a14:hiddenEffects xmlns:a14="http://schemas.microsoft.com/office/drawing/2010/main">
+                <a:effectLst>
+                  <a:outerShdw dist="35921" dir="2700000" algn="ctr" rotWithShape="0">
+                    <a:schemeClr val="bg2"/>
+                  </a:outerShdw>
+                </a:effectLst>
+              </a14:hiddenEffects>
+            </a:ext>
+          </a:extLst>
+        </p:spPr>
+      </p:pic>
+      <p:pic>
+        <p:nvPicPr>
+          <p:cNvPr id="1027" name="Picture 3"/>
+          <p:cNvPicPr>
+            <a:picLocks noChangeAspect="1" noChangeArrowheads="1"/>
+          </p:cNvPicPr>
+          <p:nvPr/>
+        </p:nvPicPr>
+        <p:blipFill>
+          <a:blip r:embed="rId3">
+            <a:extLst>
+              <a:ext uri="{28A0092B-C50C-407E-A947-70E740481C1C}">
+                <a14:useLocalDpi xmlns:a14="http://schemas.microsoft.com/office/drawing/2010/main" val="0"/>
+              </a:ext>
+            </a:extLst>
+          </a:blip>
+          <a:srcRect/>
+          <a:stretch>
+            <a:fillRect/>
+          </a:stretch>
+        </p:blipFill>
+        <p:spPr bwMode="auto">
+          <a:xfrm>
+            <a:off x="4499992" y="1772814"/>
+            <a:ext cx="4959593" cy="3718217"/>
+          </a:xfrm>
+          <a:prstGeom prst="rect">
+            <a:avLst/>
+          </a:prstGeom>
+          <a:noFill/>
+          <a:ln>
+            <a:noFill/>
+          </a:ln>
+          <a:effectLst/>
+          <a:extLst>
+            <a:ext uri="{909E8E84-426E-40DD-AFC4-6F175D3DCCD1}">
+              <a14:hiddenFill xmlns:a14="http://schemas.microsoft.com/office/drawing/2010/main">
+                <a:solidFill>
+                  <a:schemeClr val="accent1"/>
+                </a:solidFill>
+              </a14:hiddenFill>
+            </a:ext>
+            <a:ext uri="{91240B29-F687-4F45-9708-019B960494DF}">
+              <a14:hiddenLine xmlns:a14="http://schemas.microsoft.com/office/drawing/2010/main" w="9525">
+                <a:solidFill>
+                  <a:schemeClr val="tx1"/>
+                </a:solidFill>
+                <a:miter lim="800000"/>
+                <a:headEnd/>
+                <a:tailEnd/>
+              </a14:hiddenLine>
+            </a:ext>
+            <a:ext uri="{AF507438-7753-43E0-B8FC-AC1667EBCBE1}">
+              <a14:hiddenEffects xmlns:a14="http://schemas.microsoft.com/office/drawing/2010/main">
+                <a:effectLst>
+                  <a:outerShdw dist="35921" dir="2700000" algn="ctr" rotWithShape="0">
+                    <a:schemeClr val="bg2"/>
+                  </a:outerShdw>
+                </a:effectLst>
+              </a14:hiddenEffects>
+            </a:ext>
+          </a:extLst>
+        </p:spPr>
+      </p:pic>
     </p:spTree>
     <p:extLst>
       <p:ext uri="{BB962C8B-B14F-4D97-AF65-F5344CB8AC3E}">
-        <p14:creationId xmlns:p14="http://schemas.microsoft.com/office/powerpoint/2010/main" val="571593387"/>
+        <p14:creationId xmlns:p14="http://schemas.microsoft.com/office/powerpoint/2010/main" val="4229917420"/>
       </p:ext>
     </p:extLst>
   </p:cSld>
@@ -6986,238 +7748,47 @@
           <a:chExt cx="0" cy="0"/>
         </a:xfrm>
       </p:grpSpPr>
-      <p:pic>
-        <p:nvPicPr>
-          <p:cNvPr id="2050" name="Picture 2"/>
-          <p:cNvPicPr>
-            <a:picLocks noChangeAspect="1" noChangeArrowheads="1"/>
-          </p:cNvPicPr>
-          <p:nvPr/>
-        </p:nvPicPr>
-        <p:blipFill>
-          <a:blip r:embed="rId2">
-            <a:extLst>
-              <a:ext uri="{28A0092B-C50C-407E-A947-70E740481C1C}">
-                <a14:useLocalDpi xmlns:a14="http://schemas.microsoft.com/office/drawing/2010/main" val="0"/>
-              </a:ext>
-            </a:extLst>
-          </a:blip>
-          <a:srcRect/>
-          <a:stretch>
-            <a:fillRect/>
-          </a:stretch>
-        </p:blipFill>
-        <p:spPr bwMode="auto">
-          <a:xfrm>
-            <a:off x="251520" y="1436295"/>
-            <a:ext cx="4200606" cy="3149203"/>
-          </a:xfrm>
-          <a:prstGeom prst="rect">
-            <a:avLst/>
-          </a:prstGeom>
-          <a:noFill/>
-          <a:ln>
-            <a:noFill/>
-          </a:ln>
-          <a:effectLst/>
-          <a:extLst>
-            <a:ext uri="{909E8E84-426E-40DD-AFC4-6F175D3DCCD1}">
-              <a14:hiddenFill xmlns:a14="http://schemas.microsoft.com/office/drawing/2010/main">
-                <a:solidFill>
-                  <a:schemeClr val="accent1"/>
-                </a:solidFill>
-              </a14:hiddenFill>
-            </a:ext>
-            <a:ext uri="{91240B29-F687-4F45-9708-019B960494DF}">
-              <a14:hiddenLine xmlns:a14="http://schemas.microsoft.com/office/drawing/2010/main" w="9525">
-                <a:solidFill>
-                  <a:schemeClr val="tx1"/>
-                </a:solidFill>
-                <a:miter lim="800000"/>
-                <a:headEnd/>
-                <a:tailEnd/>
-              </a14:hiddenLine>
-            </a:ext>
-            <a:ext uri="{AF507438-7753-43E0-B8FC-AC1667EBCBE1}">
-              <a14:hiddenEffects xmlns:a14="http://schemas.microsoft.com/office/drawing/2010/main">
-                <a:effectLst>
-                  <a:outerShdw dist="35921" dir="2700000" algn="ctr" rotWithShape="0">
-                    <a:schemeClr val="bg2"/>
-                  </a:outerShdw>
-                </a:effectLst>
-              </a14:hiddenEffects>
-            </a:ext>
-          </a:extLst>
-        </p:spPr>
-      </p:pic>
-      <p:sp>
-        <p:nvSpPr>
-          <p:cNvPr id="2" name="TextBox 1"/>
-          <p:cNvSpPr txBox="1"/>
-          <p:nvPr/>
+      <p:sp>
+        <p:nvSpPr>
+          <p:cNvPr id="2" name="כותרת 1"/>
+          <p:cNvSpPr>
+            <a:spLocks noGrp="1"/>
+          </p:cNvSpPr>
+          <p:nvPr>
+            <p:ph type="ctrTitle"/>
+          </p:nvPr>
         </p:nvSpPr>
         <p:spPr>
           <a:xfrm>
-            <a:off x="251520" y="620688"/>
-            <a:ext cx="6768752" cy="646331"/>
-          </a:xfrm>
-          <a:prstGeom prst="rect">
-            <a:avLst/>
-          </a:prstGeom>
-          <a:noFill/>
-        </p:spPr>
-        <p:txBody>
-          <a:bodyPr wrap="square" rtlCol="1">
-            <a:spAutoFit/>
+            <a:off x="1043608" y="1700808"/>
+            <a:ext cx="7406640" cy="1472184"/>
+          </a:xfrm>
+        </p:spPr>
+        <p:txBody>
+          <a:bodyPr>
+            <a:noAutofit/>
           </a:bodyPr>
           <a:lstStyle/>
           <a:p>
-            <a:pPr algn="l"/>
-            <a:r>
-              <a:rPr lang="en-US" dirty="0" smtClean="0"/>
-              <a:t>Train data: C02,C03,C04</a:t>
-            </a:r>
-          </a:p>
-          <a:p>
-            <a:pPr algn="l"/>
-            <a:r>
-              <a:rPr lang="en-US" dirty="0" smtClean="0"/>
-              <a:t>Test data:   C01</a:t>
-            </a:r>
-            <a:endParaRPr lang="he-IL" dirty="0"/>
-          </a:p>
-        </p:txBody>
-      </p:sp>
-      <p:pic>
-        <p:nvPicPr>
-          <p:cNvPr id="4" name="Picture 2"/>
-          <p:cNvPicPr>
-            <a:picLocks noChangeAspect="1" noChangeArrowheads="1"/>
-          </p:cNvPicPr>
-          <p:nvPr/>
-        </p:nvPicPr>
-        <p:blipFill>
-          <a:blip r:embed="rId3">
-            <a:extLst>
-              <a:ext uri="{28A0092B-C50C-407E-A947-70E740481C1C}">
-                <a14:useLocalDpi xmlns:a14="http://schemas.microsoft.com/office/drawing/2010/main" val="0"/>
-              </a:ext>
-            </a:extLst>
-          </a:blip>
-          <a:srcRect/>
-          <a:stretch>
-            <a:fillRect/>
-          </a:stretch>
-        </p:blipFill>
-        <p:spPr bwMode="auto">
-          <a:xfrm>
-            <a:off x="4509575" y="1436295"/>
-            <a:ext cx="4265282" cy="3197691"/>
-          </a:xfrm>
-          <a:prstGeom prst="rect">
-            <a:avLst/>
-          </a:prstGeom>
-          <a:noFill/>
-          <a:ln>
-            <a:noFill/>
-          </a:ln>
-          <a:effectLst/>
-          <a:extLst>
-            <a:ext uri="{909E8E84-426E-40DD-AFC4-6F175D3DCCD1}">
-              <a14:hiddenFill xmlns:a14="http://schemas.microsoft.com/office/drawing/2010/main">
-                <a:solidFill>
-                  <a:schemeClr val="accent1"/>
-                </a:solidFill>
-              </a14:hiddenFill>
-            </a:ext>
-            <a:ext uri="{91240B29-F687-4F45-9708-019B960494DF}">
-              <a14:hiddenLine xmlns:a14="http://schemas.microsoft.com/office/drawing/2010/main" w="9525">
-                <a:solidFill>
-                  <a:schemeClr val="tx1"/>
-                </a:solidFill>
-                <a:miter lim="800000"/>
-                <a:headEnd/>
-                <a:tailEnd/>
-              </a14:hiddenLine>
-            </a:ext>
-            <a:ext uri="{AF507438-7753-43E0-B8FC-AC1667EBCBE1}">
-              <a14:hiddenEffects xmlns:a14="http://schemas.microsoft.com/office/drawing/2010/main">
-                <a:effectLst>
-                  <a:outerShdw dist="35921" dir="2700000" algn="ctr" rotWithShape="0">
-                    <a:schemeClr val="bg2"/>
-                  </a:outerShdw>
-                </a:effectLst>
-              </a14:hiddenEffects>
-            </a:ext>
-          </a:extLst>
-        </p:spPr>
-      </p:pic>
-      <p:sp>
-        <p:nvSpPr>
-          <p:cNvPr id="3" name="TextBox 2"/>
-          <p:cNvSpPr txBox="1"/>
-          <p:nvPr/>
-        </p:nvSpPr>
-        <p:spPr>
-          <a:xfrm>
-            <a:off x="5580112" y="5013176"/>
-            <a:ext cx="2592288" cy="369332"/>
-          </a:xfrm>
-          <a:prstGeom prst="rect">
-            <a:avLst/>
-          </a:prstGeom>
-          <a:noFill/>
-        </p:spPr>
-        <p:txBody>
-          <a:bodyPr wrap="square" rtlCol="1">
-            <a:spAutoFit/>
-          </a:bodyPr>
-          <a:lstStyle/>
-          <a:p>
             <a:pPr algn="ctr"/>
             <a:r>
-              <a:rPr lang="en-US" dirty="0" smtClean="0"/>
-              <a:t>With PT</a:t>
-            </a:r>
-            <a:endParaRPr lang="he-IL" dirty="0"/>
-          </a:p>
-        </p:txBody>
-      </p:sp>
-      <p:sp>
-        <p:nvSpPr>
-          <p:cNvPr id="6" name="TextBox 5"/>
-          <p:cNvSpPr txBox="1"/>
-          <p:nvPr/>
-        </p:nvSpPr>
-        <p:spPr>
-          <a:xfrm>
-            <a:off x="899592" y="5013176"/>
-            <a:ext cx="2592288" cy="369332"/>
-          </a:xfrm>
-          <a:prstGeom prst="rect">
-            <a:avLst/>
-          </a:prstGeom>
-          <a:noFill/>
-        </p:spPr>
-        <p:txBody>
-          <a:bodyPr wrap="square" rtlCol="1">
-            <a:spAutoFit/>
-          </a:bodyPr>
-          <a:lstStyle/>
-          <a:p>
-            <a:pPr algn="ctr"/>
-            <a:r>
-              <a:rPr lang="en-US" dirty="0" smtClean="0"/>
-              <a:t>Without PT</a:t>
-            </a:r>
-            <a:endParaRPr lang="he-IL" dirty="0"/>
+              <a:rPr lang="en-US" sz="8000" b="1" dirty="0" smtClean="0">
+                <a:latin typeface="Times New Roman" panose="02020603050405020304" pitchFamily="18" charset="0"/>
+                <a:cs typeface="Times New Roman" panose="02020603050405020304" pitchFamily="18" charset="0"/>
+              </a:rPr>
+              <a:t>Confusion Matrix</a:t>
+            </a:r>
+            <a:endParaRPr lang="he-IL" sz="8000" b="1" dirty="0">
+              <a:latin typeface="Times New Roman" panose="02020603050405020304" pitchFamily="18" charset="0"/>
+              <a:cs typeface="Times New Roman" panose="02020603050405020304" pitchFamily="18" charset="0"/>
+            </a:endParaRPr>
           </a:p>
         </p:txBody>
       </p:sp>
     </p:spTree>
     <p:extLst>
       <p:ext uri="{BB962C8B-B14F-4D97-AF65-F5344CB8AC3E}">
-        <p14:creationId xmlns:p14="http://schemas.microsoft.com/office/powerpoint/2010/main" val="3542822798"/>
+        <p14:creationId xmlns:p14="http://schemas.microsoft.com/office/powerpoint/2010/main" val="571593387"/>
       </p:ext>
     </p:extLst>
   </p:cSld>

</xml_diff>